<commit_message>
created PDF from exam-guide
</commit_message>
<xml_diff>
--- a/raw/examination_guide/Examination-Guide-EN.pptx
+++ b/raw/examination_guide/Examination-Guide-EN.pptx
@@ -9768,113 +9768,6 @@
             <a:endParaRPr lang="de-DE" sz="3600" b="1" i="0" u="none" strike="noStrike" kern="1200" cap="none" spc="0" baseline="0" dirty="0">
               <a:solidFill>
                 <a:srgbClr val="666666"/>
-              </a:solidFill>
-              <a:uFillTx/>
-              <a:latin typeface="Arial" pitchFamily="18"/>
-              <a:ea typeface="SimSun" pitchFamily="2"/>
-              <a:cs typeface="Lucida Sans" pitchFamily="2"/>
-            </a:endParaRPr>
-          </a:p>
-        </p:txBody>
-      </p:sp>
-      <p:sp>
-        <p:nvSpPr>
-          <p:cNvPr id="4" name="Textfeld 3">
-            <a:extLst>
-              <a:ext uri="{FF2B5EF4-FFF2-40B4-BE49-F238E27FC236}">
-                <a16:creationId xmlns:a16="http://schemas.microsoft.com/office/drawing/2014/main" id="{39D7E83F-4822-4D7A-B5A0-F6DBA0E9A051}"/>
-              </a:ext>
-            </a:extLst>
-          </p:cNvPr>
-          <p:cNvSpPr txBox="1"/>
-          <p:nvPr/>
-        </p:nvSpPr>
-        <p:spPr>
-          <a:xfrm>
-            <a:off x="431999" y="5723997"/>
-            <a:ext cx="3431633" cy="798627"/>
-          </a:xfrm>
-          <a:prstGeom prst="rect">
-            <a:avLst/>
-          </a:prstGeom>
-          <a:noFill/>
-          <a:ln cap="flat">
-            <a:noFill/>
-          </a:ln>
-        </p:spPr>
-        <p:txBody>
-          <a:bodyPr vert="horz" wrap="none" lIns="90004" tIns="44997" rIns="90004" bIns="44997" anchor="t" anchorCtr="0" compatLnSpc="0">
-            <a:spAutoFit/>
-          </a:bodyPr>
-          <a:lstStyle/>
-          <a:p>
-            <a:pPr marL="0" marR="0" lvl="0" indent="0" algn="l" defTabSz="914400" rtl="0" fontAlgn="auto" hangingPunct="0">
-              <a:lnSpc>
-                <a:spcPct val="100000"/>
-              </a:lnSpc>
-              <a:spcBef>
-                <a:spcPts val="0"/>
-              </a:spcBef>
-              <a:spcAft>
-                <a:spcPts val="0"/>
-              </a:spcAft>
-              <a:buNone/>
-              <a:tabLst/>
-              <a:defRPr sz="1800" b="0" i="0" u="none" strike="noStrike" kern="0" cap="none" spc="0" baseline="0">
-                <a:solidFill>
-                  <a:srgbClr val="000000"/>
-                </a:solidFill>
-                <a:uFillTx/>
-              </a:defRPr>
-            </a:pPr>
-            <a:r>
-              <a:rPr lang="de-DE" sz="2400" b="1" i="0" u="none" strike="noStrike" kern="1200" cap="none" spc="0" baseline="0">
-                <a:solidFill>
-                  <a:srgbClr val="FFFFFF"/>
-                </a:solidFill>
-                <a:uFillTx/>
-                <a:latin typeface="Arial" pitchFamily="18"/>
-                <a:ea typeface="SimSun" pitchFamily="2"/>
-                <a:cs typeface="Lucida Sans" pitchFamily="2"/>
-              </a:rPr>
-              <a:t>Name of the presenter</a:t>
-            </a:r>
-          </a:p>
-          <a:p>
-            <a:pPr marL="0" marR="0" lvl="0" indent="0" algn="l" defTabSz="914400" rtl="0" fontAlgn="auto" hangingPunct="0">
-              <a:lnSpc>
-                <a:spcPct val="100000"/>
-              </a:lnSpc>
-              <a:spcBef>
-                <a:spcPts val="0"/>
-              </a:spcBef>
-              <a:spcAft>
-                <a:spcPts val="0"/>
-              </a:spcAft>
-              <a:buNone/>
-              <a:tabLst/>
-              <a:defRPr sz="1800" b="0" i="0" u="none" strike="noStrike" kern="0" cap="none" spc="0" baseline="0">
-                <a:solidFill>
-                  <a:srgbClr val="000000"/>
-                </a:solidFill>
-                <a:uFillTx/>
-              </a:defRPr>
-            </a:pPr>
-            <a:r>
-              <a:rPr lang="de-DE" sz="2400" b="1" i="0" u="none" strike="noStrike" kern="0" cap="none" spc="0" baseline="0">
-                <a:solidFill>
-                  <a:srgbClr val="FFFFFF"/>
-                </a:solidFill>
-                <a:uFillTx/>
-                <a:latin typeface="Arial" pitchFamily="18"/>
-                <a:ea typeface="SimSun" pitchFamily="2"/>
-                <a:cs typeface="Lucida Sans" pitchFamily="2"/>
-              </a:rPr>
-              <a:t>Date</a:t>
-            </a:r>
-            <a:endParaRPr lang="de-DE" sz="2400" b="1" i="0" u="none" strike="noStrike" kern="1200" cap="none" spc="0" baseline="0">
-              <a:solidFill>
-                <a:srgbClr val="FFFFFF"/>
               </a:solidFill>
               <a:uFillTx/>
               <a:latin typeface="Arial" pitchFamily="18"/>

</xml_diff>